<commit_message>
Complete Blazor component sample and powerpoint files
</commit_message>
<xml_diff>
--- a/BlazorComonent.pptx
+++ b/BlazorComonent.pptx
@@ -19,19 +19,27 @@
     <p:sldId id="314" r:id="rId12"/>
     <p:sldId id="315" r:id="rId13"/>
     <p:sldId id="320" r:id="rId14"/>
-    <p:sldId id="303" r:id="rId15"/>
-    <p:sldId id="304" r:id="rId16"/>
+    <p:sldId id="324" r:id="rId15"/>
+    <p:sldId id="323" r:id="rId16"/>
+    <p:sldId id="325" r:id="rId17"/>
+    <p:sldId id="326" r:id="rId18"/>
+    <p:sldId id="327" r:id="rId19"/>
+    <p:sldId id="328" r:id="rId20"/>
+    <p:sldId id="332" r:id="rId21"/>
+    <p:sldId id="333" r:id="rId22"/>
+    <p:sldId id="334" r:id="rId23"/>
+    <p:sldId id="304" r:id="rId24"/>
   </p:sldIdLst>
   <p:sldSz cx="9144000" cy="5143500"/>
   <p:notesSz cx="6858000" cy="9144000"/>
   <p:embeddedFontLst>
     <p:embeddedFont>
       <p:font typeface="PT Sans Narrow" panose="020B0506020203020204"/>
-      <p:regular r:id="rId20"/>
+      <p:regular r:id="rId28"/>
     </p:embeddedFont>
     <p:embeddedFont>
       <p:font typeface="Open Sans" panose="020B0306030504020204"/>
-      <p:regular r:id="rId21"/>
+      <p:regular r:id="rId29"/>
     </p:embeddedFont>
   </p:embeddedFontLst>
   <p:defaultTextStyle>
@@ -1003,7 +1011,7 @@
   <p:cSld>
     <p:spTree>
       <p:nvGrpSpPr>
-        <p:cNvPr id="441" name="Shape 441"/>
+        <p:cNvPr id="74" name="Shape 74"/>
         <p:cNvGrpSpPr/>
         <p:nvPr/>
       </p:nvGrpSpPr>
@@ -1017,7 +1025,7 @@
       </p:grpSpPr>
       <p:sp>
         <p:nvSpPr>
-          <p:cNvPr id="442" name="Google Shape;442;gcb89376c82_0_23:notes"/>
+          <p:cNvPr id="75" name="Google Shape;75;gcad7496ea3_0_0:notes"/>
           <p:cNvSpPr/>
           <p:nvPr>
             <p:ph type="sldImg" idx="2"/>
@@ -1056,7 +1064,7 @@
       </p:sp>
       <p:sp>
         <p:nvSpPr>
-          <p:cNvPr id="443" name="Google Shape;443;gcb89376c82_0_23:notes"/>
+          <p:cNvPr id="76" name="Google Shape;76;gcad7496ea3_0_0:notes"/>
           <p:cNvSpPr txBox="1"/>
           <p:nvPr>
             <p:ph type="body" idx="1"/>
@@ -1086,11 +1094,6 @@
               </a:spcAft>
               <a:buNone/>
             </a:pPr>
-            <a:r>
-              <a:rPr lang="en-GB"/>
-              <a:t>Generic version vs runtime version</a:t>
-            </a:r>
-            <a:endParaRPr lang="en-GB"/>
           </a:p>
         </p:txBody>
       </p:sp>
@@ -1107,7 +1110,7 @@
   <p:cSld>
     <p:spTree>
       <p:nvGrpSpPr>
-        <p:cNvPr id="447" name="Shape 447"/>
+        <p:cNvPr id="74" name="Shape 74"/>
         <p:cNvGrpSpPr/>
         <p:nvPr/>
       </p:nvGrpSpPr>
@@ -1121,7 +1124,7 @@
       </p:grpSpPr>
       <p:sp>
         <p:nvSpPr>
-          <p:cNvPr id="448" name="Google Shape;448;gcb89376c82_0_37:notes"/>
+          <p:cNvPr id="75" name="Google Shape;75;gcad7496ea3_0_0:notes"/>
           <p:cNvSpPr/>
           <p:nvPr>
             <p:ph type="sldImg" idx="2"/>
@@ -1160,7 +1163,601 @@
       </p:sp>
       <p:sp>
         <p:nvSpPr>
-          <p:cNvPr id="449" name="Google Shape;449;gcb89376c82_0_37:notes"/>
+          <p:cNvPr id="76" name="Google Shape;76;gcad7496ea3_0_0:notes"/>
+          <p:cNvSpPr txBox="1"/>
+          <p:nvPr>
+            <p:ph type="body" idx="1"/>
+          </p:nvPr>
+        </p:nvSpPr>
+        <p:spPr>
+          <a:xfrm>
+            <a:off x="685800" y="4343400"/>
+            <a:ext cx="5486400" cy="4114800"/>
+          </a:xfrm>
+          <a:prstGeom prst="rect">
+            <a:avLst/>
+          </a:prstGeom>
+        </p:spPr>
+        <p:txBody>
+          <a:bodyPr spcFirstLastPara="1" wrap="square" lIns="91425" tIns="91425" rIns="91425" bIns="91425" anchor="t" anchorCtr="0">
+            <a:noAutofit/>
+          </a:bodyPr>
+          <a:lstStyle/>
+          <a:p>
+            <a:pPr marL="0" lvl="0" indent="0" algn="l" rtl="0">
+              <a:spcBef>
+                <a:spcPts val="0"/>
+              </a:spcBef>
+              <a:spcAft>
+                <a:spcPts val="0"/>
+              </a:spcAft>
+              <a:buNone/>
+            </a:pPr>
+          </a:p>
+        </p:txBody>
+      </p:sp>
+    </p:spTree>
+  </p:cSld>
+  <p:clrMapOvr>
+    <a:masterClrMapping/>
+  </p:clrMapOvr>
+</p:notes>
+</file>
+
+<file path=ppt/notesSlides/notesSlide14.xml><?xml version="1.0" encoding="utf-8"?>
+<p:notes xmlns:a="http://schemas.openxmlformats.org/drawingml/2006/main" xmlns:r="http://schemas.openxmlformats.org/officeDocument/2006/relationships" xmlns:p="http://schemas.openxmlformats.org/presentationml/2006/main" showMasterPhAnim="0" showMasterSp="0">
+  <p:cSld>
+    <p:spTree>
+      <p:nvGrpSpPr>
+        <p:cNvPr id="74" name="Shape 74"/>
+        <p:cNvGrpSpPr/>
+        <p:nvPr/>
+      </p:nvGrpSpPr>
+      <p:grpSpPr>
+        <a:xfrm>
+          <a:off x="0" y="0"/>
+          <a:ext cx="0" cy="0"/>
+          <a:chOff x="0" y="0"/>
+          <a:chExt cx="0" cy="0"/>
+        </a:xfrm>
+      </p:grpSpPr>
+      <p:sp>
+        <p:nvSpPr>
+          <p:cNvPr id="75" name="Google Shape;75;gcad7496ea3_0_0:notes"/>
+          <p:cNvSpPr/>
+          <p:nvPr>
+            <p:ph type="sldImg" idx="2"/>
+          </p:nvPr>
+        </p:nvSpPr>
+        <p:spPr>
+          <a:xfrm>
+            <a:off x="381300" y="685800"/>
+            <a:ext cx="6096000" cy="3429000"/>
+          </a:xfrm>
+          <a:custGeom>
+            <a:avLst/>
+            <a:gdLst/>
+            <a:ahLst/>
+            <a:cxnLst/>
+            <a:rect l="l" t="t" r="r" b="b"/>
+            <a:pathLst>
+              <a:path w="120000" h="120000" extrusionOk="0">
+                <a:moveTo>
+                  <a:pt x="0" y="0"/>
+                </a:moveTo>
+                <a:lnTo>
+                  <a:pt x="120000" y="0"/>
+                </a:lnTo>
+                <a:lnTo>
+                  <a:pt x="120000" y="120000"/>
+                </a:lnTo>
+                <a:lnTo>
+                  <a:pt x="0" y="120000"/>
+                </a:lnTo>
+                <a:close/>
+              </a:path>
+            </a:pathLst>
+          </a:custGeom>
+        </p:spPr>
+      </p:sp>
+      <p:sp>
+        <p:nvSpPr>
+          <p:cNvPr id="76" name="Google Shape;76;gcad7496ea3_0_0:notes"/>
+          <p:cNvSpPr txBox="1"/>
+          <p:nvPr>
+            <p:ph type="body" idx="1"/>
+          </p:nvPr>
+        </p:nvSpPr>
+        <p:spPr>
+          <a:xfrm>
+            <a:off x="685800" y="4343400"/>
+            <a:ext cx="5486400" cy="4114800"/>
+          </a:xfrm>
+          <a:prstGeom prst="rect">
+            <a:avLst/>
+          </a:prstGeom>
+        </p:spPr>
+        <p:txBody>
+          <a:bodyPr spcFirstLastPara="1" wrap="square" lIns="91425" tIns="91425" rIns="91425" bIns="91425" anchor="t" anchorCtr="0">
+            <a:noAutofit/>
+          </a:bodyPr>
+          <a:lstStyle/>
+          <a:p>
+            <a:pPr marL="0" lvl="0" indent="0" algn="l" rtl="0">
+              <a:spcBef>
+                <a:spcPts val="0"/>
+              </a:spcBef>
+              <a:spcAft>
+                <a:spcPts val="0"/>
+              </a:spcAft>
+              <a:buNone/>
+            </a:pPr>
+          </a:p>
+        </p:txBody>
+      </p:sp>
+    </p:spTree>
+  </p:cSld>
+  <p:clrMapOvr>
+    <a:masterClrMapping/>
+  </p:clrMapOvr>
+</p:notes>
+</file>
+
+<file path=ppt/notesSlides/notesSlide15.xml><?xml version="1.0" encoding="utf-8"?>
+<p:notes xmlns:a="http://schemas.openxmlformats.org/drawingml/2006/main" xmlns:r="http://schemas.openxmlformats.org/officeDocument/2006/relationships" xmlns:p="http://schemas.openxmlformats.org/presentationml/2006/main" showMasterPhAnim="0" showMasterSp="0">
+  <p:cSld>
+    <p:spTree>
+      <p:nvGrpSpPr>
+        <p:cNvPr id="74" name="Shape 74"/>
+        <p:cNvGrpSpPr/>
+        <p:nvPr/>
+      </p:nvGrpSpPr>
+      <p:grpSpPr>
+        <a:xfrm>
+          <a:off x="0" y="0"/>
+          <a:ext cx="0" cy="0"/>
+          <a:chOff x="0" y="0"/>
+          <a:chExt cx="0" cy="0"/>
+        </a:xfrm>
+      </p:grpSpPr>
+      <p:sp>
+        <p:nvSpPr>
+          <p:cNvPr id="75" name="Google Shape;75;gcad7496ea3_0_0:notes"/>
+          <p:cNvSpPr/>
+          <p:nvPr>
+            <p:ph type="sldImg" idx="2"/>
+          </p:nvPr>
+        </p:nvSpPr>
+        <p:spPr>
+          <a:xfrm>
+            <a:off x="381300" y="685800"/>
+            <a:ext cx="6096000" cy="3429000"/>
+          </a:xfrm>
+          <a:custGeom>
+            <a:avLst/>
+            <a:gdLst/>
+            <a:ahLst/>
+            <a:cxnLst/>
+            <a:rect l="l" t="t" r="r" b="b"/>
+            <a:pathLst>
+              <a:path w="120000" h="120000" extrusionOk="0">
+                <a:moveTo>
+                  <a:pt x="0" y="0"/>
+                </a:moveTo>
+                <a:lnTo>
+                  <a:pt x="120000" y="0"/>
+                </a:lnTo>
+                <a:lnTo>
+                  <a:pt x="120000" y="120000"/>
+                </a:lnTo>
+                <a:lnTo>
+                  <a:pt x="0" y="120000"/>
+                </a:lnTo>
+                <a:close/>
+              </a:path>
+            </a:pathLst>
+          </a:custGeom>
+        </p:spPr>
+      </p:sp>
+      <p:sp>
+        <p:nvSpPr>
+          <p:cNvPr id="76" name="Google Shape;76;gcad7496ea3_0_0:notes"/>
+          <p:cNvSpPr txBox="1"/>
+          <p:nvPr>
+            <p:ph type="body" idx="1"/>
+          </p:nvPr>
+        </p:nvSpPr>
+        <p:spPr>
+          <a:xfrm>
+            <a:off x="685800" y="4343400"/>
+            <a:ext cx="5486400" cy="4114800"/>
+          </a:xfrm>
+          <a:prstGeom prst="rect">
+            <a:avLst/>
+          </a:prstGeom>
+        </p:spPr>
+        <p:txBody>
+          <a:bodyPr spcFirstLastPara="1" wrap="square" lIns="91425" tIns="91425" rIns="91425" bIns="91425" anchor="t" anchorCtr="0">
+            <a:noAutofit/>
+          </a:bodyPr>
+          <a:lstStyle/>
+          <a:p>
+            <a:pPr marL="0" lvl="0" indent="0" algn="l" rtl="0">
+              <a:spcBef>
+                <a:spcPts val="0"/>
+              </a:spcBef>
+              <a:spcAft>
+                <a:spcPts val="0"/>
+              </a:spcAft>
+              <a:buNone/>
+            </a:pPr>
+          </a:p>
+        </p:txBody>
+      </p:sp>
+    </p:spTree>
+  </p:cSld>
+  <p:clrMapOvr>
+    <a:masterClrMapping/>
+  </p:clrMapOvr>
+</p:notes>
+</file>
+
+<file path=ppt/notesSlides/notesSlide16.xml><?xml version="1.0" encoding="utf-8"?>
+<p:notes xmlns:a="http://schemas.openxmlformats.org/drawingml/2006/main" xmlns:r="http://schemas.openxmlformats.org/officeDocument/2006/relationships" xmlns:p="http://schemas.openxmlformats.org/presentationml/2006/main" showMasterPhAnim="0" showMasterSp="0">
+  <p:cSld>
+    <p:spTree>
+      <p:nvGrpSpPr>
+        <p:cNvPr id="74" name="Shape 74"/>
+        <p:cNvGrpSpPr/>
+        <p:nvPr/>
+      </p:nvGrpSpPr>
+      <p:grpSpPr>
+        <a:xfrm>
+          <a:off x="0" y="0"/>
+          <a:ext cx="0" cy="0"/>
+          <a:chOff x="0" y="0"/>
+          <a:chExt cx="0" cy="0"/>
+        </a:xfrm>
+      </p:grpSpPr>
+      <p:sp>
+        <p:nvSpPr>
+          <p:cNvPr id="75" name="Google Shape;75;gcad7496ea3_0_0:notes"/>
+          <p:cNvSpPr/>
+          <p:nvPr>
+            <p:ph type="sldImg" idx="2"/>
+          </p:nvPr>
+        </p:nvSpPr>
+        <p:spPr>
+          <a:xfrm>
+            <a:off x="381300" y="685800"/>
+            <a:ext cx="6096000" cy="3429000"/>
+          </a:xfrm>
+          <a:custGeom>
+            <a:avLst/>
+            <a:gdLst/>
+            <a:ahLst/>
+            <a:cxnLst/>
+            <a:rect l="l" t="t" r="r" b="b"/>
+            <a:pathLst>
+              <a:path w="120000" h="120000" extrusionOk="0">
+                <a:moveTo>
+                  <a:pt x="0" y="0"/>
+                </a:moveTo>
+                <a:lnTo>
+                  <a:pt x="120000" y="0"/>
+                </a:lnTo>
+                <a:lnTo>
+                  <a:pt x="120000" y="120000"/>
+                </a:lnTo>
+                <a:lnTo>
+                  <a:pt x="0" y="120000"/>
+                </a:lnTo>
+                <a:close/>
+              </a:path>
+            </a:pathLst>
+          </a:custGeom>
+        </p:spPr>
+      </p:sp>
+      <p:sp>
+        <p:nvSpPr>
+          <p:cNvPr id="76" name="Google Shape;76;gcad7496ea3_0_0:notes"/>
+          <p:cNvSpPr txBox="1"/>
+          <p:nvPr>
+            <p:ph type="body" idx="1"/>
+          </p:nvPr>
+        </p:nvSpPr>
+        <p:spPr>
+          <a:xfrm>
+            <a:off x="685800" y="4343400"/>
+            <a:ext cx="5486400" cy="4114800"/>
+          </a:xfrm>
+          <a:prstGeom prst="rect">
+            <a:avLst/>
+          </a:prstGeom>
+        </p:spPr>
+        <p:txBody>
+          <a:bodyPr spcFirstLastPara="1" wrap="square" lIns="91425" tIns="91425" rIns="91425" bIns="91425" anchor="t" anchorCtr="0">
+            <a:noAutofit/>
+          </a:bodyPr>
+          <a:lstStyle/>
+          <a:p>
+            <a:pPr marL="0" lvl="0" indent="0" algn="l" rtl="0">
+              <a:spcBef>
+                <a:spcPts val="0"/>
+              </a:spcBef>
+              <a:spcAft>
+                <a:spcPts val="0"/>
+              </a:spcAft>
+              <a:buNone/>
+            </a:pPr>
+          </a:p>
+        </p:txBody>
+      </p:sp>
+    </p:spTree>
+  </p:cSld>
+  <p:clrMapOvr>
+    <a:masterClrMapping/>
+  </p:clrMapOvr>
+</p:notes>
+</file>
+
+<file path=ppt/notesSlides/notesSlide17.xml><?xml version="1.0" encoding="utf-8"?>
+<p:notes xmlns:a="http://schemas.openxmlformats.org/drawingml/2006/main" xmlns:r="http://schemas.openxmlformats.org/officeDocument/2006/relationships" xmlns:p="http://schemas.openxmlformats.org/presentationml/2006/main" showMasterPhAnim="0" showMasterSp="0">
+  <p:cSld>
+    <p:spTree>
+      <p:nvGrpSpPr>
+        <p:cNvPr id="74" name="Shape 74"/>
+        <p:cNvGrpSpPr/>
+        <p:nvPr/>
+      </p:nvGrpSpPr>
+      <p:grpSpPr>
+        <a:xfrm>
+          <a:off x="0" y="0"/>
+          <a:ext cx="0" cy="0"/>
+          <a:chOff x="0" y="0"/>
+          <a:chExt cx="0" cy="0"/>
+        </a:xfrm>
+      </p:grpSpPr>
+      <p:sp>
+        <p:nvSpPr>
+          <p:cNvPr id="75" name="Google Shape;75;gcad7496ea3_0_0:notes"/>
+          <p:cNvSpPr/>
+          <p:nvPr>
+            <p:ph type="sldImg" idx="2"/>
+          </p:nvPr>
+        </p:nvSpPr>
+        <p:spPr>
+          <a:xfrm>
+            <a:off x="381300" y="685800"/>
+            <a:ext cx="6096000" cy="3429000"/>
+          </a:xfrm>
+          <a:custGeom>
+            <a:avLst/>
+            <a:gdLst/>
+            <a:ahLst/>
+            <a:cxnLst/>
+            <a:rect l="l" t="t" r="r" b="b"/>
+            <a:pathLst>
+              <a:path w="120000" h="120000" extrusionOk="0">
+                <a:moveTo>
+                  <a:pt x="0" y="0"/>
+                </a:moveTo>
+                <a:lnTo>
+                  <a:pt x="120000" y="0"/>
+                </a:lnTo>
+                <a:lnTo>
+                  <a:pt x="120000" y="120000"/>
+                </a:lnTo>
+                <a:lnTo>
+                  <a:pt x="0" y="120000"/>
+                </a:lnTo>
+                <a:close/>
+              </a:path>
+            </a:pathLst>
+          </a:custGeom>
+        </p:spPr>
+      </p:sp>
+      <p:sp>
+        <p:nvSpPr>
+          <p:cNvPr id="76" name="Google Shape;76;gcad7496ea3_0_0:notes"/>
+          <p:cNvSpPr txBox="1"/>
+          <p:nvPr>
+            <p:ph type="body" idx="1"/>
+          </p:nvPr>
+        </p:nvSpPr>
+        <p:spPr>
+          <a:xfrm>
+            <a:off x="685800" y="4343400"/>
+            <a:ext cx="5486400" cy="4114800"/>
+          </a:xfrm>
+          <a:prstGeom prst="rect">
+            <a:avLst/>
+          </a:prstGeom>
+        </p:spPr>
+        <p:txBody>
+          <a:bodyPr spcFirstLastPara="1" wrap="square" lIns="91425" tIns="91425" rIns="91425" bIns="91425" anchor="t" anchorCtr="0">
+            <a:noAutofit/>
+          </a:bodyPr>
+          <a:lstStyle/>
+          <a:p>
+            <a:pPr marL="0" lvl="0" indent="0" algn="l" rtl="0">
+              <a:spcBef>
+                <a:spcPts val="0"/>
+              </a:spcBef>
+              <a:spcAft>
+                <a:spcPts val="0"/>
+              </a:spcAft>
+              <a:buNone/>
+            </a:pPr>
+          </a:p>
+        </p:txBody>
+      </p:sp>
+    </p:spTree>
+  </p:cSld>
+  <p:clrMapOvr>
+    <a:masterClrMapping/>
+  </p:clrMapOvr>
+</p:notes>
+</file>
+
+<file path=ppt/notesSlides/notesSlide18.xml><?xml version="1.0" encoding="utf-8"?>
+<p:notes xmlns:a="http://schemas.openxmlformats.org/drawingml/2006/main" xmlns:r="http://schemas.openxmlformats.org/officeDocument/2006/relationships" xmlns:p="http://schemas.openxmlformats.org/presentationml/2006/main" showMasterPhAnim="0" showMasterSp="0">
+  <p:cSld>
+    <p:spTree>
+      <p:nvGrpSpPr>
+        <p:cNvPr id="74" name="Shape 74"/>
+        <p:cNvGrpSpPr/>
+        <p:nvPr/>
+      </p:nvGrpSpPr>
+      <p:grpSpPr>
+        <a:xfrm>
+          <a:off x="0" y="0"/>
+          <a:ext cx="0" cy="0"/>
+          <a:chOff x="0" y="0"/>
+          <a:chExt cx="0" cy="0"/>
+        </a:xfrm>
+      </p:grpSpPr>
+      <p:sp>
+        <p:nvSpPr>
+          <p:cNvPr id="75" name="Google Shape;75;gcad7496ea3_0_0:notes"/>
+          <p:cNvSpPr/>
+          <p:nvPr>
+            <p:ph type="sldImg" idx="2"/>
+          </p:nvPr>
+        </p:nvSpPr>
+        <p:spPr>
+          <a:xfrm>
+            <a:off x="381300" y="685800"/>
+            <a:ext cx="6096000" cy="3429000"/>
+          </a:xfrm>
+          <a:custGeom>
+            <a:avLst/>
+            <a:gdLst/>
+            <a:ahLst/>
+            <a:cxnLst/>
+            <a:rect l="l" t="t" r="r" b="b"/>
+            <a:pathLst>
+              <a:path w="120000" h="120000" extrusionOk="0">
+                <a:moveTo>
+                  <a:pt x="0" y="0"/>
+                </a:moveTo>
+                <a:lnTo>
+                  <a:pt x="120000" y="0"/>
+                </a:lnTo>
+                <a:lnTo>
+                  <a:pt x="120000" y="120000"/>
+                </a:lnTo>
+                <a:lnTo>
+                  <a:pt x="0" y="120000"/>
+                </a:lnTo>
+                <a:close/>
+              </a:path>
+            </a:pathLst>
+          </a:custGeom>
+        </p:spPr>
+      </p:sp>
+      <p:sp>
+        <p:nvSpPr>
+          <p:cNvPr id="76" name="Google Shape;76;gcad7496ea3_0_0:notes"/>
+          <p:cNvSpPr txBox="1"/>
+          <p:nvPr>
+            <p:ph type="body" idx="1"/>
+          </p:nvPr>
+        </p:nvSpPr>
+        <p:spPr>
+          <a:xfrm>
+            <a:off x="685800" y="4343400"/>
+            <a:ext cx="5486400" cy="4114800"/>
+          </a:xfrm>
+          <a:prstGeom prst="rect">
+            <a:avLst/>
+          </a:prstGeom>
+        </p:spPr>
+        <p:txBody>
+          <a:bodyPr spcFirstLastPara="1" wrap="square" lIns="91425" tIns="91425" rIns="91425" bIns="91425" anchor="t" anchorCtr="0">
+            <a:noAutofit/>
+          </a:bodyPr>
+          <a:lstStyle/>
+          <a:p>
+            <a:pPr marL="0" lvl="0" indent="0" algn="l" rtl="0">
+              <a:spcBef>
+                <a:spcPts val="0"/>
+              </a:spcBef>
+              <a:spcAft>
+                <a:spcPts val="0"/>
+              </a:spcAft>
+              <a:buNone/>
+            </a:pPr>
+          </a:p>
+        </p:txBody>
+      </p:sp>
+    </p:spTree>
+  </p:cSld>
+  <p:clrMapOvr>
+    <a:masterClrMapping/>
+  </p:clrMapOvr>
+</p:notes>
+</file>
+
+<file path=ppt/notesSlides/notesSlide19.xml><?xml version="1.0" encoding="utf-8"?>
+<p:notes xmlns:a="http://schemas.openxmlformats.org/drawingml/2006/main" xmlns:r="http://schemas.openxmlformats.org/officeDocument/2006/relationships" xmlns:p="http://schemas.openxmlformats.org/presentationml/2006/main" showMasterPhAnim="0" showMasterSp="0">
+  <p:cSld>
+    <p:spTree>
+      <p:nvGrpSpPr>
+        <p:cNvPr id="74" name="Shape 74"/>
+        <p:cNvGrpSpPr/>
+        <p:nvPr/>
+      </p:nvGrpSpPr>
+      <p:grpSpPr>
+        <a:xfrm>
+          <a:off x="0" y="0"/>
+          <a:ext cx="0" cy="0"/>
+          <a:chOff x="0" y="0"/>
+          <a:chExt cx="0" cy="0"/>
+        </a:xfrm>
+      </p:grpSpPr>
+      <p:sp>
+        <p:nvSpPr>
+          <p:cNvPr id="75" name="Google Shape;75;gcad7496ea3_0_0:notes"/>
+          <p:cNvSpPr/>
+          <p:nvPr>
+            <p:ph type="sldImg" idx="2"/>
+          </p:nvPr>
+        </p:nvSpPr>
+        <p:spPr>
+          <a:xfrm>
+            <a:off x="381300" y="685800"/>
+            <a:ext cx="6096000" cy="3429000"/>
+          </a:xfrm>
+          <a:custGeom>
+            <a:avLst/>
+            <a:gdLst/>
+            <a:ahLst/>
+            <a:cxnLst/>
+            <a:rect l="l" t="t" r="r" b="b"/>
+            <a:pathLst>
+              <a:path w="120000" h="120000" extrusionOk="0">
+                <a:moveTo>
+                  <a:pt x="0" y="0"/>
+                </a:moveTo>
+                <a:lnTo>
+                  <a:pt x="120000" y="0"/>
+                </a:lnTo>
+                <a:lnTo>
+                  <a:pt x="120000" y="120000"/>
+                </a:lnTo>
+                <a:lnTo>
+                  <a:pt x="0" y="120000"/>
+                </a:lnTo>
+                <a:close/>
+              </a:path>
+            </a:pathLst>
+          </a:custGeom>
+        </p:spPr>
+      </p:sp>
+      <p:sp>
+        <p:nvSpPr>
+          <p:cNvPr id="76" name="Google Shape;76;gcad7496ea3_0_0:notes"/>
           <p:cNvSpPr txBox="1"/>
           <p:nvPr>
             <p:ph type="body" idx="1"/>
@@ -1260,6 +1857,204 @@
       <p:sp>
         <p:nvSpPr>
           <p:cNvPr id="70" name="Google Shape;70;gca9cf01e22_0_57:notes"/>
+          <p:cNvSpPr txBox="1"/>
+          <p:nvPr>
+            <p:ph type="body" idx="1"/>
+          </p:nvPr>
+        </p:nvSpPr>
+        <p:spPr>
+          <a:xfrm>
+            <a:off x="685800" y="4343400"/>
+            <a:ext cx="5486400" cy="4114800"/>
+          </a:xfrm>
+          <a:prstGeom prst="rect">
+            <a:avLst/>
+          </a:prstGeom>
+        </p:spPr>
+        <p:txBody>
+          <a:bodyPr spcFirstLastPara="1" wrap="square" lIns="91425" tIns="91425" rIns="91425" bIns="91425" anchor="t" anchorCtr="0">
+            <a:noAutofit/>
+          </a:bodyPr>
+          <a:lstStyle/>
+          <a:p>
+            <a:pPr marL="0" lvl="0" indent="0" algn="l" rtl="0">
+              <a:spcBef>
+                <a:spcPts val="0"/>
+              </a:spcBef>
+              <a:spcAft>
+                <a:spcPts val="0"/>
+              </a:spcAft>
+              <a:buNone/>
+            </a:pPr>
+          </a:p>
+        </p:txBody>
+      </p:sp>
+    </p:spTree>
+  </p:cSld>
+  <p:clrMapOvr>
+    <a:masterClrMapping/>
+  </p:clrMapOvr>
+</p:notes>
+</file>
+
+<file path=ppt/notesSlides/notesSlide20.xml><?xml version="1.0" encoding="utf-8"?>
+<p:notes xmlns:a="http://schemas.openxmlformats.org/drawingml/2006/main" xmlns:r="http://schemas.openxmlformats.org/officeDocument/2006/relationships" xmlns:p="http://schemas.openxmlformats.org/presentationml/2006/main" showMasterPhAnim="0" showMasterSp="0">
+  <p:cSld>
+    <p:spTree>
+      <p:nvGrpSpPr>
+        <p:cNvPr id="74" name="Shape 74"/>
+        <p:cNvGrpSpPr/>
+        <p:nvPr/>
+      </p:nvGrpSpPr>
+      <p:grpSpPr>
+        <a:xfrm>
+          <a:off x="0" y="0"/>
+          <a:ext cx="0" cy="0"/>
+          <a:chOff x="0" y="0"/>
+          <a:chExt cx="0" cy="0"/>
+        </a:xfrm>
+      </p:grpSpPr>
+      <p:sp>
+        <p:nvSpPr>
+          <p:cNvPr id="75" name="Google Shape;75;gcad7496ea3_0_0:notes"/>
+          <p:cNvSpPr/>
+          <p:nvPr>
+            <p:ph type="sldImg" idx="2"/>
+          </p:nvPr>
+        </p:nvSpPr>
+        <p:spPr>
+          <a:xfrm>
+            <a:off x="381300" y="685800"/>
+            <a:ext cx="6096000" cy="3429000"/>
+          </a:xfrm>
+          <a:custGeom>
+            <a:avLst/>
+            <a:gdLst/>
+            <a:ahLst/>
+            <a:cxnLst/>
+            <a:rect l="l" t="t" r="r" b="b"/>
+            <a:pathLst>
+              <a:path w="120000" h="120000" extrusionOk="0">
+                <a:moveTo>
+                  <a:pt x="0" y="0"/>
+                </a:moveTo>
+                <a:lnTo>
+                  <a:pt x="120000" y="0"/>
+                </a:lnTo>
+                <a:lnTo>
+                  <a:pt x="120000" y="120000"/>
+                </a:lnTo>
+                <a:lnTo>
+                  <a:pt x="0" y="120000"/>
+                </a:lnTo>
+                <a:close/>
+              </a:path>
+            </a:pathLst>
+          </a:custGeom>
+        </p:spPr>
+      </p:sp>
+      <p:sp>
+        <p:nvSpPr>
+          <p:cNvPr id="76" name="Google Shape;76;gcad7496ea3_0_0:notes"/>
+          <p:cNvSpPr txBox="1"/>
+          <p:nvPr>
+            <p:ph type="body" idx="1"/>
+          </p:nvPr>
+        </p:nvSpPr>
+        <p:spPr>
+          <a:xfrm>
+            <a:off x="685800" y="4343400"/>
+            <a:ext cx="5486400" cy="4114800"/>
+          </a:xfrm>
+          <a:prstGeom prst="rect">
+            <a:avLst/>
+          </a:prstGeom>
+        </p:spPr>
+        <p:txBody>
+          <a:bodyPr spcFirstLastPara="1" wrap="square" lIns="91425" tIns="91425" rIns="91425" bIns="91425" anchor="t" anchorCtr="0">
+            <a:noAutofit/>
+          </a:bodyPr>
+          <a:lstStyle/>
+          <a:p>
+            <a:pPr marL="0" lvl="0" indent="0" algn="l" rtl="0">
+              <a:spcBef>
+                <a:spcPts val="0"/>
+              </a:spcBef>
+              <a:spcAft>
+                <a:spcPts val="0"/>
+              </a:spcAft>
+              <a:buNone/>
+            </a:pPr>
+          </a:p>
+        </p:txBody>
+      </p:sp>
+    </p:spTree>
+  </p:cSld>
+  <p:clrMapOvr>
+    <a:masterClrMapping/>
+  </p:clrMapOvr>
+</p:notes>
+</file>
+
+<file path=ppt/notesSlides/notesSlide21.xml><?xml version="1.0" encoding="utf-8"?>
+<p:notes xmlns:a="http://schemas.openxmlformats.org/drawingml/2006/main" xmlns:r="http://schemas.openxmlformats.org/officeDocument/2006/relationships" xmlns:p="http://schemas.openxmlformats.org/presentationml/2006/main" showMasterPhAnim="0" showMasterSp="0">
+  <p:cSld>
+    <p:spTree>
+      <p:nvGrpSpPr>
+        <p:cNvPr id="447" name="Shape 447"/>
+        <p:cNvGrpSpPr/>
+        <p:nvPr/>
+      </p:nvGrpSpPr>
+      <p:grpSpPr>
+        <a:xfrm>
+          <a:off x="0" y="0"/>
+          <a:ext cx="0" cy="0"/>
+          <a:chOff x="0" y="0"/>
+          <a:chExt cx="0" cy="0"/>
+        </a:xfrm>
+      </p:grpSpPr>
+      <p:sp>
+        <p:nvSpPr>
+          <p:cNvPr id="448" name="Google Shape;448;gcb89376c82_0_37:notes"/>
+          <p:cNvSpPr/>
+          <p:nvPr>
+            <p:ph type="sldImg" idx="2"/>
+          </p:nvPr>
+        </p:nvSpPr>
+        <p:spPr>
+          <a:xfrm>
+            <a:off x="381300" y="685800"/>
+            <a:ext cx="6096000" cy="3429000"/>
+          </a:xfrm>
+          <a:custGeom>
+            <a:avLst/>
+            <a:gdLst/>
+            <a:ahLst/>
+            <a:cxnLst/>
+            <a:rect l="l" t="t" r="r" b="b"/>
+            <a:pathLst>
+              <a:path w="120000" h="120000" extrusionOk="0">
+                <a:moveTo>
+                  <a:pt x="0" y="0"/>
+                </a:moveTo>
+                <a:lnTo>
+                  <a:pt x="120000" y="0"/>
+                </a:lnTo>
+                <a:lnTo>
+                  <a:pt x="120000" y="120000"/>
+                </a:lnTo>
+                <a:lnTo>
+                  <a:pt x="0" y="120000"/>
+                </a:lnTo>
+                <a:close/>
+              </a:path>
+            </a:pathLst>
+          </a:custGeom>
+        </p:spPr>
+      </p:sp>
+      <p:sp>
+        <p:nvSpPr>
+          <p:cNvPr id="449" name="Google Shape;449;gcb89376c82_0_37:notes"/>
           <p:cNvSpPr txBox="1"/>
           <p:nvPr>
             <p:ph type="body" idx="1"/>
@@ -7722,7 +8517,7 @@
       </p:sp>
       <p:pic>
         <p:nvPicPr>
-          <p:cNvPr id="1" name="Picture 0"/>
+          <p:cNvPr id="2" name="Picture 1"/>
           <p:cNvPicPr>
             <a:picLocks noChangeAspect="1"/>
           </p:cNvPicPr>
@@ -7757,7 +8552,7 @@
   <p:cSld>
     <p:spTree>
       <p:nvGrpSpPr>
-        <p:cNvPr id="444" name="Shape 444"/>
+        <p:cNvPr id="77" name="Shape 77"/>
         <p:cNvGrpSpPr/>
         <p:nvPr/>
       </p:nvGrpSpPr>
@@ -7771,7 +8566,7 @@
       </p:grpSpPr>
       <p:sp>
         <p:nvSpPr>
-          <p:cNvPr id="445" name="Google Shape;445;p60"/>
+          <p:cNvPr id="78" name="Google Shape;78;p15"/>
           <p:cNvSpPr txBox="1"/>
           <p:nvPr>
             <p:ph type="title"/>
@@ -7779,7 +8574,7 @@
         </p:nvSpPr>
         <p:spPr>
           <a:xfrm>
-            <a:off x="311700" y="445025"/>
+            <a:off x="311700" y="228490"/>
             <a:ext cx="8520600" cy="707400"/>
           </a:xfrm>
           <a:prstGeom prst="rect">
@@ -7799,23 +8594,28 @@
               <a:spcAft>
                 <a:spcPts val="0"/>
               </a:spcAft>
+              <a:buSzPts val="990"/>
               <a:buNone/>
             </a:pPr>
             <a:r>
-              <a:rPr lang="en-GB" sz="2940"/>
+              <a:rPr lang="en-US" altLang="en-GB" sz="2940"/>
               <a:t>5</a:t>
             </a:r>
             <a:r>
               <a:rPr lang="en-GB" sz="2940"/>
-              <a:t>. Discussion</a:t>
+              <a:t>. </a:t>
             </a:r>
-            <a:endParaRPr sz="2940"/>
+            <a:r>
+              <a:rPr lang="en-US" altLang="en-GB" sz="2940"/>
+              <a:t>Parial Classes</a:t>
+            </a:r>
+            <a:endParaRPr lang="en-US" altLang="en-GB" sz="2940"/>
           </a:p>
         </p:txBody>
       </p:sp>
       <p:sp>
         <p:nvSpPr>
-          <p:cNvPr id="446" name="Google Shape;446;p60"/>
+          <p:cNvPr id="79" name="Google Shape;79;p15"/>
           <p:cNvSpPr txBox="1"/>
           <p:nvPr>
             <p:ph type="body" idx="1"/>
@@ -7823,8 +8623,8 @@
         </p:nvSpPr>
         <p:spPr>
           <a:xfrm>
-            <a:off x="311700" y="1266325"/>
-            <a:ext cx="8520600" cy="3302700"/>
+            <a:off x="311785" y="3402965"/>
+            <a:ext cx="8520430" cy="1165860"/>
           </a:xfrm>
           <a:prstGeom prst="rect">
             <a:avLst/>
@@ -7836,25 +8636,9 @@
           </a:bodyPr>
           <a:lstStyle/>
           <a:p>
-            <a:pPr marL="0" lvl="0" indent="0" algn="l" rtl="0">
-              <a:spcBef>
-                <a:spcPts val="0"/>
-              </a:spcBef>
-              <a:spcAft>
-                <a:spcPts val="0"/>
-              </a:spcAft>
-              <a:buNone/>
-            </a:pPr>
-            <a:r>
-              <a:rPr lang="en-GB"/>
-              <a:t>References: </a:t>
-            </a:r>
-            <a:endParaRPr lang="en-GB"/>
-          </a:p>
-          <a:p>
             <a:pPr marL="457200" lvl="0" indent="-342900" algn="l" rtl="0">
               <a:spcBef>
-                <a:spcPts val="1200"/>
+                <a:spcPts val="0"/>
               </a:spcBef>
               <a:spcAft>
                 <a:spcPts val="0"/>
@@ -7863,18 +8647,13 @@
               <a:buChar char="+"/>
             </a:pPr>
             <a:r>
-              <a:rPr lang="en-GB" u="sng">
-                <a:solidFill>
-                  <a:schemeClr val="hlink"/>
-                </a:solidFill>
-                <a:hlinkClick r:id="rId1"/>
+              <a:rPr lang="en-US" altLang="en-GB" b="1">
+                <a:sym typeface="+mn-ea"/>
               </a:rPr>
-              <a:t>Microsoft - Dependency injection in ASP.NET Core</a:t>
+              <a:t>Allow us to pass a value from a component to all of its descendants without having to use traditional component parameters</a:t>
             </a:r>
-            <a:endParaRPr lang="en-GB" u="sng">
-              <a:solidFill>
-                <a:schemeClr val="hlink"/>
-              </a:solidFill>
+            <a:endParaRPr lang="en-US" altLang="en-GB" b="1">
+              <a:sym typeface="+mn-ea"/>
             </a:endParaRPr>
           </a:p>
           <a:p>
@@ -7889,85 +8668,43 @@
               <a:buChar char="+"/>
             </a:pPr>
             <a:r>
-              <a:rPr lang="en-GB" u="sng">
-                <a:solidFill>
-                  <a:schemeClr val="hlink"/>
-                </a:solidFill>
-                <a:hlinkClick r:id="rId2"/>
+              <a:rPr lang="en-US" altLang="en-GB" b="1">
+                <a:sym typeface="+mn-ea"/>
               </a:rPr>
-              <a:t>Microsoft - Dependency injection in .NET</a:t>
+              <a:t>The cs class has must be the same name with the razor component</a:t>
             </a:r>
-            <a:endParaRPr lang="en-GB" u="sng">
+            <a:endParaRPr lang="en-US">
               <a:solidFill>
-                <a:schemeClr val="hlink"/>
+                <a:srgbClr val="B45F06"/>
               </a:solidFill>
             </a:endParaRPr>
           </a:p>
-          <a:p>
-            <a:pPr marL="457200" lvl="0" indent="-342900" algn="l" rtl="0">
-              <a:spcBef>
-                <a:spcPts val="0"/>
-              </a:spcBef>
-              <a:spcAft>
-                <a:spcPts val="0"/>
-              </a:spcAft>
-              <a:buSzPts val="1800"/>
-              <a:buChar char="+"/>
-            </a:pPr>
-            <a:r>
-              <a:rPr lang="en-GB" u="sng">
-                <a:solidFill>
-                  <a:schemeClr val="hlink"/>
-                </a:solidFill>
-                <a:hlinkClick r:id="rId3"/>
-              </a:rPr>
-              <a:t>Tutorialsteacher - Dependency Injection in ASP.NET Core</a:t>
-            </a:r>
-            <a:endParaRPr lang="en-GB" u="sng">
-              <a:solidFill>
-                <a:schemeClr val="hlink"/>
-              </a:solidFill>
-            </a:endParaRPr>
-          </a:p>
-          <a:p>
-            <a:pPr marL="457200" lvl="0" indent="-342900" algn="l" rtl="0">
-              <a:spcBef>
-                <a:spcPts val="0"/>
-              </a:spcBef>
-              <a:spcAft>
-                <a:spcPts val="0"/>
-              </a:spcAft>
-              <a:buSzPts val="1800"/>
-              <a:buChar char="+"/>
-            </a:pPr>
-            <a:r>
-              <a:rPr lang="en-GB" u="sng">
-                <a:solidFill>
-                  <a:schemeClr val="hlink"/>
-                </a:solidFill>
-                <a:hlinkClick r:id="rId4"/>
-              </a:rPr>
-              <a:t>IoC Container Benchmark - Performance comparison</a:t>
-            </a:r>
-            <a:endParaRPr lang="en-GB" u="sng">
-              <a:solidFill>
-                <a:schemeClr val="hlink"/>
-              </a:solidFill>
-            </a:endParaRPr>
-          </a:p>
-          <a:p>
-            <a:pPr marL="0" lvl="0" indent="0" algn="l" rtl="0">
-              <a:spcBef>
-                <a:spcPts val="1200"/>
-              </a:spcBef>
-              <a:spcAft>
-                <a:spcPts val="1200"/>
-              </a:spcAft>
-              <a:buNone/>
-            </a:pPr>
-          </a:p>
         </p:txBody>
       </p:sp>
+      <p:pic>
+        <p:nvPicPr>
+          <p:cNvPr id="2" name="Picture 1"/>
+          <p:cNvPicPr>
+            <a:picLocks noChangeAspect="1"/>
+          </p:cNvPicPr>
+          <p:nvPr/>
+        </p:nvPicPr>
+        <p:blipFill>
+          <a:blip r:embed="rId1"/>
+          <a:stretch>
+            <a:fillRect/>
+          </a:stretch>
+        </p:blipFill>
+        <p:spPr>
+          <a:xfrm>
+            <a:off x="1005840" y="935990"/>
+            <a:ext cx="7132320" cy="2245995"/>
+          </a:xfrm>
+          <a:prstGeom prst="rect">
+            <a:avLst/>
+          </a:prstGeom>
+        </p:spPr>
+      </p:pic>
     </p:spTree>
   </p:cSld>
   <p:clrMapOvr>
@@ -7981,7 +8718,7 @@
   <p:cSld>
     <p:spTree>
       <p:nvGrpSpPr>
-        <p:cNvPr id="450" name="Shape 450"/>
+        <p:cNvPr id="77" name="Shape 77"/>
         <p:cNvGrpSpPr/>
         <p:nvPr/>
       </p:nvGrpSpPr>
@@ -7995,7 +8732,7 @@
       </p:grpSpPr>
       <p:sp>
         <p:nvSpPr>
-          <p:cNvPr id="451" name="Google Shape;451;p61"/>
+          <p:cNvPr id="78" name="Google Shape;78;p15"/>
           <p:cNvSpPr txBox="1"/>
           <p:nvPr>
             <p:ph type="title"/>
@@ -8003,36 +8740,947 @@
         </p:nvSpPr>
         <p:spPr>
           <a:xfrm>
-            <a:off x="311700" y="814800"/>
-            <a:ext cx="8571300" cy="942000"/>
+            <a:off x="311700" y="228490"/>
+            <a:ext cx="8520600" cy="707400"/>
           </a:xfrm>
           <a:prstGeom prst="rect">
             <a:avLst/>
           </a:prstGeom>
         </p:spPr>
         <p:txBody>
-          <a:bodyPr spcFirstLastPara="1" wrap="square" lIns="91425" tIns="91425" rIns="91425" bIns="91425" anchor="ctr" anchorCtr="0">
+          <a:bodyPr spcFirstLastPara="1" wrap="square" lIns="91425" tIns="91425" rIns="91425" bIns="91425" anchor="t" anchorCtr="0">
             <a:normAutofit/>
           </a:bodyPr>
           <a:lstStyle/>
           <a:p>
-            <a:pPr marL="0" lvl="0" indent="0" algn="ctr" rtl="0">
-              <a:spcBef>
-                <a:spcPts val="0"/>
-              </a:spcBef>
-              <a:spcAft>
-                <a:spcPts val="0"/>
-              </a:spcAft>
+            <a:pPr marL="0" lvl="0" indent="0" algn="l" rtl="0">
+              <a:spcBef>
+                <a:spcPts val="0"/>
+              </a:spcBef>
+              <a:spcAft>
+                <a:spcPts val="0"/>
+              </a:spcAft>
+              <a:buSzPts val="990"/>
               <a:buNone/>
             </a:pPr>
             <a:r>
-              <a:rPr lang="en-GB"/>
-              <a:t>THANKS FOR LISTENING</a:t>
+              <a:rPr lang="en-US" altLang="en-GB" sz="2940"/>
+              <a:t>6</a:t>
             </a:r>
-            <a:endParaRPr lang="en-GB"/>
+            <a:r>
+              <a:rPr lang="en-GB" sz="2940"/>
+              <a:t>. </a:t>
+            </a:r>
+            <a:r>
+              <a:rPr lang="en-US" altLang="en-GB" sz="2940"/>
+              <a:t>Layout</a:t>
+            </a:r>
+            <a:endParaRPr lang="en-US" altLang="en-GB" sz="2940"/>
           </a:p>
         </p:txBody>
       </p:sp>
+      <p:sp>
+        <p:nvSpPr>
+          <p:cNvPr id="79" name="Google Shape;79;p15"/>
+          <p:cNvSpPr txBox="1"/>
+          <p:nvPr>
+            <p:ph type="body" idx="1"/>
+          </p:nvPr>
+        </p:nvSpPr>
+        <p:spPr>
+          <a:xfrm>
+            <a:off x="311785" y="3402965"/>
+            <a:ext cx="8520430" cy="1165860"/>
+          </a:xfrm>
+          <a:prstGeom prst="rect">
+            <a:avLst/>
+          </a:prstGeom>
+        </p:spPr>
+        <p:txBody>
+          <a:bodyPr spcFirstLastPara="1" wrap="square" lIns="91425" tIns="91425" rIns="91425" bIns="91425" anchor="t" anchorCtr="0">
+            <a:normAutofit/>
+          </a:bodyPr>
+          <a:lstStyle/>
+          <a:p>
+            <a:pPr marL="457200" lvl="0" indent="-342900" algn="l" rtl="0">
+              <a:spcBef>
+                <a:spcPts val="0"/>
+              </a:spcBef>
+              <a:spcAft>
+                <a:spcPts val="0"/>
+              </a:spcAft>
+              <a:buSzPts val="1800"/>
+              <a:buChar char="+"/>
+            </a:pPr>
+            <a:r>
+              <a:rPr lang="en-US" altLang="en-GB" b="1">
+                <a:sym typeface="+mn-ea"/>
+              </a:rPr>
+              <a:t>You can define your own layout and use it</a:t>
+            </a:r>
+            <a:endParaRPr lang="en-US">
+              <a:solidFill>
+                <a:srgbClr val="B45F06"/>
+              </a:solidFill>
+            </a:endParaRPr>
+          </a:p>
+        </p:txBody>
+      </p:sp>
+      <p:pic>
+        <p:nvPicPr>
+          <p:cNvPr id="3" name="Picture 2"/>
+          <p:cNvPicPr>
+            <a:picLocks noChangeAspect="1"/>
+          </p:cNvPicPr>
+          <p:nvPr/>
+        </p:nvPicPr>
+        <p:blipFill>
+          <a:blip r:embed="rId1"/>
+          <a:stretch>
+            <a:fillRect/>
+          </a:stretch>
+        </p:blipFill>
+        <p:spPr>
+          <a:xfrm>
+            <a:off x="1167130" y="935990"/>
+            <a:ext cx="6810375" cy="2401570"/>
+          </a:xfrm>
+          <a:prstGeom prst="rect">
+            <a:avLst/>
+          </a:prstGeom>
+        </p:spPr>
+      </p:pic>
+    </p:spTree>
+  </p:cSld>
+  <p:clrMapOvr>
+    <a:masterClrMapping/>
+  </p:clrMapOvr>
+</p:sld>
+</file>
+
+<file path=ppt/slides/slide14.xml><?xml version="1.0" encoding="utf-8"?>
+<p:sld xmlns:a="http://schemas.openxmlformats.org/drawingml/2006/main" xmlns:r="http://schemas.openxmlformats.org/officeDocument/2006/relationships" xmlns:p="http://schemas.openxmlformats.org/presentationml/2006/main">
+  <p:cSld>
+    <p:spTree>
+      <p:nvGrpSpPr>
+        <p:cNvPr id="77" name="Shape 77"/>
+        <p:cNvGrpSpPr/>
+        <p:nvPr/>
+      </p:nvGrpSpPr>
+      <p:grpSpPr>
+        <a:xfrm>
+          <a:off x="0" y="0"/>
+          <a:ext cx="0" cy="0"/>
+          <a:chOff x="0" y="0"/>
+          <a:chExt cx="0" cy="0"/>
+        </a:xfrm>
+      </p:grpSpPr>
+      <p:sp>
+        <p:nvSpPr>
+          <p:cNvPr id="78" name="Google Shape;78;p15"/>
+          <p:cNvSpPr txBox="1"/>
+          <p:nvPr>
+            <p:ph type="title"/>
+          </p:nvPr>
+        </p:nvSpPr>
+        <p:spPr>
+          <a:xfrm>
+            <a:off x="311700" y="228490"/>
+            <a:ext cx="8520600" cy="707400"/>
+          </a:xfrm>
+          <a:prstGeom prst="rect">
+            <a:avLst/>
+          </a:prstGeom>
+        </p:spPr>
+        <p:txBody>
+          <a:bodyPr spcFirstLastPara="1" wrap="square" lIns="91425" tIns="91425" rIns="91425" bIns="91425" anchor="t" anchorCtr="0">
+            <a:normAutofit/>
+          </a:bodyPr>
+          <a:lstStyle/>
+          <a:p>
+            <a:pPr marL="0" lvl="0" indent="0" algn="l" rtl="0">
+              <a:spcBef>
+                <a:spcPts val="0"/>
+              </a:spcBef>
+              <a:spcAft>
+                <a:spcPts val="0"/>
+              </a:spcAft>
+              <a:buSzPts val="990"/>
+              <a:buNone/>
+            </a:pPr>
+            <a:r>
+              <a:rPr lang="en-US" altLang="en-GB" sz="2935">
+                <a:sym typeface="+mn-ea"/>
+              </a:rPr>
+              <a:t>7</a:t>
+            </a:r>
+            <a:r>
+              <a:rPr lang="en-GB" sz="2935">
+                <a:sym typeface="+mn-ea"/>
+              </a:rPr>
+              <a:t>. </a:t>
+            </a:r>
+            <a:r>
+              <a:rPr lang="en-US" altLang="en-GB" sz="2935">
+                <a:sym typeface="+mn-ea"/>
+              </a:rPr>
+              <a:t>Invoking JS function from C#</a:t>
+            </a:r>
+            <a:endParaRPr lang="en-US" altLang="en-GB" sz="2940"/>
+          </a:p>
+        </p:txBody>
+      </p:sp>
+      <p:pic>
+        <p:nvPicPr>
+          <p:cNvPr id="2" name="Picture 1"/>
+          <p:cNvPicPr>
+            <a:picLocks noChangeAspect="1"/>
+          </p:cNvPicPr>
+          <p:nvPr/>
+        </p:nvPicPr>
+        <p:blipFill>
+          <a:blip r:embed="rId1"/>
+          <a:stretch>
+            <a:fillRect/>
+          </a:stretch>
+        </p:blipFill>
+        <p:spPr>
+          <a:xfrm>
+            <a:off x="631190" y="935990"/>
+            <a:ext cx="7994650" cy="3145155"/>
+          </a:xfrm>
+          <a:prstGeom prst="rect">
+            <a:avLst/>
+          </a:prstGeom>
+        </p:spPr>
+      </p:pic>
+    </p:spTree>
+  </p:cSld>
+  <p:clrMapOvr>
+    <a:masterClrMapping/>
+  </p:clrMapOvr>
+</p:sld>
+</file>
+
+<file path=ppt/slides/slide15.xml><?xml version="1.0" encoding="utf-8"?>
+<p:sld xmlns:a="http://schemas.openxmlformats.org/drawingml/2006/main" xmlns:r="http://schemas.openxmlformats.org/officeDocument/2006/relationships" xmlns:p="http://schemas.openxmlformats.org/presentationml/2006/main">
+  <p:cSld>
+    <p:spTree>
+      <p:nvGrpSpPr>
+        <p:cNvPr id="77" name="Shape 77"/>
+        <p:cNvGrpSpPr/>
+        <p:nvPr/>
+      </p:nvGrpSpPr>
+      <p:grpSpPr>
+        <a:xfrm>
+          <a:off x="0" y="0"/>
+          <a:ext cx="0" cy="0"/>
+          <a:chOff x="0" y="0"/>
+          <a:chExt cx="0" cy="0"/>
+        </a:xfrm>
+      </p:grpSpPr>
+      <p:sp>
+        <p:nvSpPr>
+          <p:cNvPr id="78" name="Google Shape;78;p15"/>
+          <p:cNvSpPr txBox="1"/>
+          <p:nvPr>
+            <p:ph type="title"/>
+          </p:nvPr>
+        </p:nvSpPr>
+        <p:spPr>
+          <a:xfrm>
+            <a:off x="311700" y="228490"/>
+            <a:ext cx="8520600" cy="707400"/>
+          </a:xfrm>
+          <a:prstGeom prst="rect">
+            <a:avLst/>
+          </a:prstGeom>
+        </p:spPr>
+        <p:txBody>
+          <a:bodyPr spcFirstLastPara="1" wrap="square" lIns="91425" tIns="91425" rIns="91425" bIns="91425" anchor="t" anchorCtr="0">
+            <a:normAutofit/>
+          </a:bodyPr>
+          <a:lstStyle/>
+          <a:p>
+            <a:pPr marL="0" lvl="0" indent="0" algn="l" rtl="0">
+              <a:spcBef>
+                <a:spcPts val="0"/>
+              </a:spcBef>
+              <a:spcAft>
+                <a:spcPts val="0"/>
+              </a:spcAft>
+              <a:buSzPts val="990"/>
+              <a:buNone/>
+            </a:pPr>
+            <a:r>
+              <a:rPr lang="en-US" altLang="en-GB" sz="2940"/>
+              <a:t>7</a:t>
+            </a:r>
+            <a:r>
+              <a:rPr lang="en-GB" sz="2940"/>
+              <a:t>. </a:t>
+            </a:r>
+            <a:r>
+              <a:rPr lang="en-US" altLang="en-GB" sz="2940"/>
+              <a:t>Invoking</a:t>
+            </a:r>
+            <a:r>
+              <a:rPr lang="en-US" altLang="en-GB" sz="2940"/>
+              <a:t> JS function from C#</a:t>
+            </a:r>
+            <a:endParaRPr lang="en-US" altLang="en-GB" sz="2940"/>
+          </a:p>
+        </p:txBody>
+      </p:sp>
+      <p:sp>
+        <p:nvSpPr>
+          <p:cNvPr id="79" name="Google Shape;79;p15"/>
+          <p:cNvSpPr txBox="1"/>
+          <p:nvPr>
+            <p:ph type="body" idx="1"/>
+          </p:nvPr>
+        </p:nvSpPr>
+        <p:spPr>
+          <a:xfrm>
+            <a:off x="311785" y="3827145"/>
+            <a:ext cx="8520430" cy="741680"/>
+          </a:xfrm>
+          <a:prstGeom prst="rect">
+            <a:avLst/>
+          </a:prstGeom>
+        </p:spPr>
+        <p:txBody>
+          <a:bodyPr spcFirstLastPara="1" wrap="square" lIns="91425" tIns="91425" rIns="91425" bIns="91425" anchor="t" anchorCtr="0">
+            <a:normAutofit/>
+          </a:bodyPr>
+          <a:lstStyle/>
+          <a:p>
+            <a:pPr marL="457200" lvl="0" indent="-342900" algn="l" rtl="0">
+              <a:spcBef>
+                <a:spcPts val="0"/>
+              </a:spcBef>
+              <a:spcAft>
+                <a:spcPts val="0"/>
+              </a:spcAft>
+              <a:buSzPts val="1800"/>
+              <a:buChar char="+"/>
+            </a:pPr>
+            <a:r>
+              <a:rPr lang="en-US" altLang="en-GB" b="1">
+                <a:sym typeface="+mn-ea"/>
+              </a:rPr>
+              <a:t>Call JS function and get return value</a:t>
+            </a:r>
+            <a:endParaRPr lang="en-US">
+              <a:solidFill>
+                <a:srgbClr val="B45F06"/>
+              </a:solidFill>
+            </a:endParaRPr>
+          </a:p>
+        </p:txBody>
+      </p:sp>
+      <p:pic>
+        <p:nvPicPr>
+          <p:cNvPr id="2" name="Picture Placeholder 1"/>
+          <p:cNvPicPr>
+            <a:picLocks noChangeAspect="1"/>
+          </p:cNvPicPr>
+          <p:nvPr>
+            <p:ph type="pic" idx="2"/>
+          </p:nvPr>
+        </p:nvPicPr>
+        <p:blipFill>
+          <a:blip r:embed="rId1"/>
+          <a:stretch>
+            <a:fillRect/>
+          </a:stretch>
+        </p:blipFill>
+        <p:spPr>
+          <a:xfrm>
+            <a:off x="1928495" y="884555"/>
+            <a:ext cx="5286375" cy="2621280"/>
+          </a:xfrm>
+          <a:prstGeom prst="rect">
+            <a:avLst/>
+          </a:prstGeom>
+        </p:spPr>
+      </p:pic>
+    </p:spTree>
+  </p:cSld>
+  <p:clrMapOvr>
+    <a:masterClrMapping/>
+  </p:clrMapOvr>
+</p:sld>
+</file>
+
+<file path=ppt/slides/slide16.xml><?xml version="1.0" encoding="utf-8"?>
+<p:sld xmlns:a="http://schemas.openxmlformats.org/drawingml/2006/main" xmlns:r="http://schemas.openxmlformats.org/officeDocument/2006/relationships" xmlns:p="http://schemas.openxmlformats.org/presentationml/2006/main">
+  <p:cSld>
+    <p:spTree>
+      <p:nvGrpSpPr>
+        <p:cNvPr id="77" name="Shape 77"/>
+        <p:cNvGrpSpPr/>
+        <p:nvPr/>
+      </p:nvGrpSpPr>
+      <p:grpSpPr>
+        <a:xfrm>
+          <a:off x="0" y="0"/>
+          <a:ext cx="0" cy="0"/>
+          <a:chOff x="0" y="0"/>
+          <a:chExt cx="0" cy="0"/>
+        </a:xfrm>
+      </p:grpSpPr>
+      <p:sp>
+        <p:nvSpPr>
+          <p:cNvPr id="78" name="Google Shape;78;p15"/>
+          <p:cNvSpPr txBox="1"/>
+          <p:nvPr>
+            <p:ph type="title"/>
+          </p:nvPr>
+        </p:nvSpPr>
+        <p:spPr>
+          <a:xfrm>
+            <a:off x="311700" y="228490"/>
+            <a:ext cx="8520600" cy="707400"/>
+          </a:xfrm>
+          <a:prstGeom prst="rect">
+            <a:avLst/>
+          </a:prstGeom>
+        </p:spPr>
+        <p:txBody>
+          <a:bodyPr spcFirstLastPara="1" wrap="square" lIns="91425" tIns="91425" rIns="91425" bIns="91425" anchor="t" anchorCtr="0">
+            <a:normAutofit/>
+          </a:bodyPr>
+          <a:lstStyle/>
+          <a:p>
+            <a:pPr marL="0" lvl="0" indent="0" algn="l" rtl="0">
+              <a:spcBef>
+                <a:spcPts val="0"/>
+              </a:spcBef>
+              <a:spcAft>
+                <a:spcPts val="0"/>
+              </a:spcAft>
+              <a:buSzPts val="990"/>
+              <a:buNone/>
+            </a:pPr>
+            <a:r>
+              <a:rPr lang="en-US" altLang="en-GB" sz="2935">
+                <a:sym typeface="+mn-ea"/>
+              </a:rPr>
+              <a:t>7</a:t>
+            </a:r>
+            <a:r>
+              <a:rPr lang="en-GB" sz="2935">
+                <a:sym typeface="+mn-ea"/>
+              </a:rPr>
+              <a:t>. </a:t>
+            </a:r>
+            <a:r>
+              <a:rPr lang="en-US" altLang="en-GB" sz="2935">
+                <a:sym typeface="+mn-ea"/>
+              </a:rPr>
+              <a:t>Invoking static C# function from JS</a:t>
+            </a:r>
+            <a:endParaRPr lang="en-US" altLang="en-GB" sz="2940"/>
+          </a:p>
+        </p:txBody>
+      </p:sp>
+      <p:pic>
+        <p:nvPicPr>
+          <p:cNvPr id="2" name="Picture Placeholder 1"/>
+          <p:cNvPicPr>
+            <a:picLocks noChangeAspect="1"/>
+          </p:cNvPicPr>
+          <p:nvPr>
+            <p:ph type="pic" idx="2"/>
+          </p:nvPr>
+        </p:nvPicPr>
+        <p:blipFill>
+          <a:blip r:embed="rId1"/>
+          <a:stretch>
+            <a:fillRect/>
+          </a:stretch>
+        </p:blipFill>
+        <p:spPr>
+          <a:xfrm>
+            <a:off x="565785" y="982345"/>
+            <a:ext cx="3128645" cy="2178685"/>
+          </a:xfrm>
+          <a:prstGeom prst="rect">
+            <a:avLst/>
+          </a:prstGeom>
+        </p:spPr>
+      </p:pic>
+      <p:pic>
+        <p:nvPicPr>
+          <p:cNvPr id="4" name="Picture 3"/>
+          <p:cNvPicPr>
+            <a:picLocks noChangeAspect="1"/>
+          </p:cNvPicPr>
+          <p:nvPr/>
+        </p:nvPicPr>
+        <p:blipFill>
+          <a:blip r:embed="rId2"/>
+          <a:stretch>
+            <a:fillRect/>
+          </a:stretch>
+        </p:blipFill>
+        <p:spPr>
+          <a:xfrm>
+            <a:off x="4088765" y="982345"/>
+            <a:ext cx="3929380" cy="1515745"/>
+          </a:xfrm>
+          <a:prstGeom prst="rect">
+            <a:avLst/>
+          </a:prstGeom>
+        </p:spPr>
+      </p:pic>
+      <p:pic>
+        <p:nvPicPr>
+          <p:cNvPr id="5" name="Picture 4"/>
+          <p:cNvPicPr>
+            <a:picLocks noChangeAspect="1"/>
+          </p:cNvPicPr>
+          <p:nvPr/>
+        </p:nvPicPr>
+        <p:blipFill>
+          <a:blip r:embed="rId3"/>
+          <a:stretch>
+            <a:fillRect/>
+          </a:stretch>
+        </p:blipFill>
+        <p:spPr>
+          <a:xfrm>
+            <a:off x="4081145" y="2810510"/>
+            <a:ext cx="3944620" cy="1758315"/>
+          </a:xfrm>
+          <a:prstGeom prst="rect">
+            <a:avLst/>
+          </a:prstGeom>
+        </p:spPr>
+      </p:pic>
+      <p:sp>
+        <p:nvSpPr>
+          <p:cNvPr id="3" name="Text Placeholder 2"/>
+          <p:cNvSpPr/>
+          <p:nvPr>
+            <p:ph type="body" idx="1"/>
+          </p:nvPr>
+        </p:nvSpPr>
+        <p:spPr/>
+        <p:txBody>
+          <a:bodyPr/>
+          <a:p>
+            <a:endParaRPr lang="en-US"/>
+          </a:p>
+        </p:txBody>
+      </p:sp>
+    </p:spTree>
+  </p:cSld>
+  <p:clrMapOvr>
+    <a:masterClrMapping/>
+  </p:clrMapOvr>
+</p:sld>
+</file>
+
+<file path=ppt/slides/slide17.xml><?xml version="1.0" encoding="utf-8"?>
+<p:sld xmlns:a="http://schemas.openxmlformats.org/drawingml/2006/main" xmlns:r="http://schemas.openxmlformats.org/officeDocument/2006/relationships" xmlns:p="http://schemas.openxmlformats.org/presentationml/2006/main">
+  <p:cSld>
+    <p:spTree>
+      <p:nvGrpSpPr>
+        <p:cNvPr id="77" name="Shape 77"/>
+        <p:cNvGrpSpPr/>
+        <p:nvPr/>
+      </p:nvGrpSpPr>
+      <p:grpSpPr>
+        <a:xfrm>
+          <a:off x="0" y="0"/>
+          <a:ext cx="0" cy="0"/>
+          <a:chOff x="0" y="0"/>
+          <a:chExt cx="0" cy="0"/>
+        </a:xfrm>
+      </p:grpSpPr>
+      <p:sp>
+        <p:nvSpPr>
+          <p:cNvPr id="78" name="Google Shape;78;p15"/>
+          <p:cNvSpPr txBox="1"/>
+          <p:nvPr>
+            <p:ph type="title"/>
+          </p:nvPr>
+        </p:nvSpPr>
+        <p:spPr>
+          <a:xfrm>
+            <a:off x="311700" y="228490"/>
+            <a:ext cx="8520600" cy="707400"/>
+          </a:xfrm>
+          <a:prstGeom prst="rect">
+            <a:avLst/>
+          </a:prstGeom>
+        </p:spPr>
+        <p:txBody>
+          <a:bodyPr spcFirstLastPara="1" wrap="square" lIns="91425" tIns="91425" rIns="91425" bIns="91425" anchor="t" anchorCtr="0">
+            <a:normAutofit/>
+          </a:bodyPr>
+          <a:lstStyle/>
+          <a:p>
+            <a:pPr marL="0" lvl="0" indent="0" algn="l" rtl="0">
+              <a:spcBef>
+                <a:spcPts val="0"/>
+              </a:spcBef>
+              <a:spcAft>
+                <a:spcPts val="0"/>
+              </a:spcAft>
+              <a:buSzPts val="990"/>
+              <a:buNone/>
+            </a:pPr>
+            <a:r>
+              <a:rPr lang="en-US" altLang="en-GB" sz="2935">
+                <a:sym typeface="+mn-ea"/>
+              </a:rPr>
+              <a:t>7</a:t>
+            </a:r>
+            <a:r>
+              <a:rPr lang="en-GB" sz="2935">
+                <a:sym typeface="+mn-ea"/>
+              </a:rPr>
+              <a:t>. </a:t>
+            </a:r>
+            <a:r>
+              <a:rPr lang="en-US" altLang="en-GB" sz="2935">
+                <a:sym typeface="+mn-ea"/>
+              </a:rPr>
+              <a:t>Invoking instance C# function from JS</a:t>
+            </a:r>
+            <a:endParaRPr lang="en-US" altLang="en-GB" sz="2940"/>
+          </a:p>
+        </p:txBody>
+      </p:sp>
+      <p:pic>
+        <p:nvPicPr>
+          <p:cNvPr id="1" name="Picture 0"/>
+          <p:cNvPicPr>
+            <a:picLocks noChangeAspect="1"/>
+          </p:cNvPicPr>
+          <p:nvPr/>
+        </p:nvPicPr>
+        <p:blipFill>
+          <a:blip r:embed="rId1"/>
+          <a:stretch>
+            <a:fillRect/>
+          </a:stretch>
+        </p:blipFill>
+        <p:spPr>
+          <a:xfrm>
+            <a:off x="675005" y="935990"/>
+            <a:ext cx="7545070" cy="3050540"/>
+          </a:xfrm>
+          <a:prstGeom prst="rect">
+            <a:avLst/>
+          </a:prstGeom>
+        </p:spPr>
+      </p:pic>
+    </p:spTree>
+  </p:cSld>
+  <p:clrMapOvr>
+    <a:masterClrMapping/>
+  </p:clrMapOvr>
+</p:sld>
+</file>
+
+<file path=ppt/slides/slide18.xml><?xml version="1.0" encoding="utf-8"?>
+<p:sld xmlns:a="http://schemas.openxmlformats.org/drawingml/2006/main" xmlns:r="http://schemas.openxmlformats.org/officeDocument/2006/relationships" xmlns:p="http://schemas.openxmlformats.org/presentationml/2006/main">
+  <p:cSld>
+    <p:spTree>
+      <p:nvGrpSpPr>
+        <p:cNvPr id="77" name="Shape 77"/>
+        <p:cNvGrpSpPr/>
+        <p:nvPr/>
+      </p:nvGrpSpPr>
+      <p:grpSpPr>
+        <a:xfrm>
+          <a:off x="0" y="0"/>
+          <a:ext cx="0" cy="0"/>
+          <a:chOff x="0" y="0"/>
+          <a:chExt cx="0" cy="0"/>
+        </a:xfrm>
+      </p:grpSpPr>
+      <p:sp>
+        <p:nvSpPr>
+          <p:cNvPr id="78" name="Google Shape;78;p15"/>
+          <p:cNvSpPr txBox="1"/>
+          <p:nvPr>
+            <p:ph type="title"/>
+          </p:nvPr>
+        </p:nvSpPr>
+        <p:spPr>
+          <a:xfrm>
+            <a:off x="311700" y="228490"/>
+            <a:ext cx="8520600" cy="707400"/>
+          </a:xfrm>
+          <a:prstGeom prst="rect">
+            <a:avLst/>
+          </a:prstGeom>
+        </p:spPr>
+        <p:txBody>
+          <a:bodyPr spcFirstLastPara="1" wrap="square" lIns="91425" tIns="91425" rIns="91425" bIns="91425" anchor="t" anchorCtr="0">
+            <a:normAutofit/>
+          </a:bodyPr>
+          <a:lstStyle/>
+          <a:p>
+            <a:pPr marL="0" lvl="0" indent="0" algn="l" rtl="0">
+              <a:spcBef>
+                <a:spcPts val="0"/>
+              </a:spcBef>
+              <a:spcAft>
+                <a:spcPts val="0"/>
+              </a:spcAft>
+              <a:buSzPts val="990"/>
+              <a:buNone/>
+            </a:pPr>
+            <a:r>
+              <a:rPr lang="en-US" altLang="en-GB" sz="2935">
+                <a:sym typeface="+mn-ea"/>
+              </a:rPr>
+              <a:t>7</a:t>
+            </a:r>
+            <a:r>
+              <a:rPr lang="en-GB" sz="2935">
+                <a:sym typeface="+mn-ea"/>
+              </a:rPr>
+              <a:t>. </a:t>
+            </a:r>
+            <a:r>
+              <a:rPr lang="en-US" altLang="en-GB" sz="2935">
+                <a:sym typeface="+mn-ea"/>
+              </a:rPr>
+              <a:t>JavaScript isolation</a:t>
+            </a:r>
+            <a:endParaRPr lang="en-US" altLang="en-GB" sz="2940"/>
+          </a:p>
+        </p:txBody>
+      </p:sp>
+      <p:sp>
+        <p:nvSpPr>
+          <p:cNvPr id="79" name="Google Shape;79;p15"/>
+          <p:cNvSpPr txBox="1"/>
+          <p:nvPr>
+            <p:ph type="body" idx="1"/>
+          </p:nvPr>
+        </p:nvSpPr>
+        <p:spPr>
+          <a:xfrm>
+            <a:off x="311785" y="3980180"/>
+            <a:ext cx="8520430" cy="588645"/>
+          </a:xfrm>
+          <a:prstGeom prst="rect">
+            <a:avLst/>
+          </a:prstGeom>
+        </p:spPr>
+        <p:txBody>
+          <a:bodyPr spcFirstLastPara="1" wrap="square" lIns="91425" tIns="91425" rIns="91425" bIns="91425" anchor="t" anchorCtr="0">
+            <a:normAutofit/>
+          </a:bodyPr>
+          <a:lstStyle/>
+          <a:p>
+            <a:pPr marL="457200" lvl="0" indent="-342900" algn="l" rtl="0">
+              <a:spcBef>
+                <a:spcPts val="0"/>
+              </a:spcBef>
+              <a:spcAft>
+                <a:spcPts val="0"/>
+              </a:spcAft>
+              <a:buSzPts val="1800"/>
+              <a:buChar char="+"/>
+            </a:pPr>
+            <a:r>
+              <a:rPr lang="en-US" altLang="en-GB" b="1">
+                <a:sym typeface="+mn-ea"/>
+              </a:rPr>
+              <a:t>We want to load certain JS files on a component that were are in.</a:t>
+            </a:r>
+            <a:endParaRPr lang="en-US">
+              <a:solidFill>
+                <a:srgbClr val="B45F06"/>
+              </a:solidFill>
+            </a:endParaRPr>
+          </a:p>
+        </p:txBody>
+      </p:sp>
+      <p:pic>
+        <p:nvPicPr>
+          <p:cNvPr id="2" name="Picture 1"/>
+          <p:cNvPicPr>
+            <a:picLocks noChangeAspect="1"/>
+          </p:cNvPicPr>
+          <p:nvPr/>
+        </p:nvPicPr>
+        <p:blipFill>
+          <a:blip r:embed="rId1"/>
+          <a:stretch>
+            <a:fillRect/>
+          </a:stretch>
+        </p:blipFill>
+        <p:spPr>
+          <a:xfrm>
+            <a:off x="1776730" y="935990"/>
+            <a:ext cx="5591175" cy="2913380"/>
+          </a:xfrm>
+          <a:prstGeom prst="rect">
+            <a:avLst/>
+          </a:prstGeom>
+        </p:spPr>
+      </p:pic>
+    </p:spTree>
+  </p:cSld>
+  <p:clrMapOvr>
+    <a:masterClrMapping/>
+  </p:clrMapOvr>
+</p:sld>
+</file>
+
+<file path=ppt/slides/slide19.xml><?xml version="1.0" encoding="utf-8"?>
+<p:sld xmlns:a="http://schemas.openxmlformats.org/drawingml/2006/main" xmlns:r="http://schemas.openxmlformats.org/officeDocument/2006/relationships" xmlns:p="http://schemas.openxmlformats.org/presentationml/2006/main">
+  <p:cSld>
+    <p:spTree>
+      <p:nvGrpSpPr>
+        <p:cNvPr id="77" name="Shape 77"/>
+        <p:cNvGrpSpPr/>
+        <p:nvPr/>
+      </p:nvGrpSpPr>
+      <p:grpSpPr>
+        <a:xfrm>
+          <a:off x="0" y="0"/>
+          <a:ext cx="0" cy="0"/>
+          <a:chOff x="0" y="0"/>
+          <a:chExt cx="0" cy="0"/>
+        </a:xfrm>
+      </p:grpSpPr>
+      <p:sp>
+        <p:nvSpPr>
+          <p:cNvPr id="78" name="Google Shape;78;p15"/>
+          <p:cNvSpPr txBox="1"/>
+          <p:nvPr>
+            <p:ph type="title"/>
+          </p:nvPr>
+        </p:nvSpPr>
+        <p:spPr>
+          <a:xfrm>
+            <a:off x="311700" y="228490"/>
+            <a:ext cx="8520600" cy="707400"/>
+          </a:xfrm>
+          <a:prstGeom prst="rect">
+            <a:avLst/>
+          </a:prstGeom>
+        </p:spPr>
+        <p:txBody>
+          <a:bodyPr spcFirstLastPara="1" wrap="square" lIns="91425" tIns="91425" rIns="91425" bIns="91425" anchor="t" anchorCtr="0">
+            <a:normAutofit/>
+          </a:bodyPr>
+          <a:lstStyle/>
+          <a:p>
+            <a:pPr marL="0" lvl="0" indent="0" algn="l" rtl="0">
+              <a:spcBef>
+                <a:spcPts val="0"/>
+              </a:spcBef>
+              <a:spcAft>
+                <a:spcPts val="0"/>
+              </a:spcAft>
+              <a:buSzPts val="990"/>
+              <a:buNone/>
+            </a:pPr>
+            <a:r>
+              <a:rPr lang="en-US" altLang="en-GB" sz="2935">
+                <a:sym typeface="+mn-ea"/>
+              </a:rPr>
+              <a:t>7</a:t>
+            </a:r>
+            <a:r>
+              <a:rPr lang="en-GB" sz="2935">
+                <a:sym typeface="+mn-ea"/>
+              </a:rPr>
+              <a:t>. </a:t>
+            </a:r>
+            <a:r>
+              <a:rPr lang="en-US" altLang="en-GB" sz="2935">
+                <a:sym typeface="+mn-ea"/>
+              </a:rPr>
+              <a:t>JavaScript isolation</a:t>
+            </a:r>
+            <a:endParaRPr lang="en-US" altLang="en-GB" sz="2940"/>
+          </a:p>
+        </p:txBody>
+      </p:sp>
+      <p:sp>
+        <p:nvSpPr>
+          <p:cNvPr id="79" name="Google Shape;79;p15"/>
+          <p:cNvSpPr txBox="1"/>
+          <p:nvPr>
+            <p:ph type="body" idx="1"/>
+          </p:nvPr>
+        </p:nvSpPr>
+        <p:spPr>
+          <a:xfrm>
+            <a:off x="311785" y="3980180"/>
+            <a:ext cx="8520430" cy="588645"/>
+          </a:xfrm>
+          <a:prstGeom prst="rect">
+            <a:avLst/>
+          </a:prstGeom>
+        </p:spPr>
+        <p:txBody>
+          <a:bodyPr spcFirstLastPara="1" wrap="square" lIns="91425" tIns="91425" rIns="91425" bIns="91425" anchor="t" anchorCtr="0">
+            <a:normAutofit/>
+          </a:bodyPr>
+          <a:lstStyle/>
+          <a:p>
+            <a:pPr marL="457200" lvl="0" indent="-342900" algn="l" rtl="0">
+              <a:spcBef>
+                <a:spcPts val="0"/>
+              </a:spcBef>
+              <a:spcAft>
+                <a:spcPts val="0"/>
+              </a:spcAft>
+              <a:buSzPts val="1800"/>
+              <a:buChar char="+"/>
+            </a:pPr>
+            <a:r>
+              <a:rPr lang="en-US" altLang="en-GB" b="1">
+                <a:sym typeface="+mn-ea"/>
+              </a:rPr>
+              <a:t>We want to load certain JS files on a component that were are in.</a:t>
+            </a:r>
+            <a:endParaRPr lang="en-US">
+              <a:solidFill>
+                <a:srgbClr val="B45F06"/>
+              </a:solidFill>
+            </a:endParaRPr>
+          </a:p>
+        </p:txBody>
+      </p:sp>
+      <p:pic>
+        <p:nvPicPr>
+          <p:cNvPr id="2" name="Picture 1"/>
+          <p:cNvPicPr>
+            <a:picLocks noChangeAspect="1"/>
+          </p:cNvPicPr>
+          <p:nvPr/>
+        </p:nvPicPr>
+        <p:blipFill>
+          <a:blip r:embed="rId1"/>
+          <a:stretch>
+            <a:fillRect/>
+          </a:stretch>
+        </p:blipFill>
+        <p:spPr>
+          <a:xfrm>
+            <a:off x="1776730" y="935990"/>
+            <a:ext cx="5591175" cy="2913380"/>
+          </a:xfrm>
+          <a:prstGeom prst="rect">
+            <a:avLst/>
+          </a:prstGeom>
+        </p:spPr>
+      </p:pic>
     </p:spTree>
   </p:cSld>
   <p:clrMapOvr>
@@ -8186,7 +9834,7 @@
               <a:rPr lang="en-US" altLang="en-GB"/>
               <a:t>RenderFragment</a:t>
             </a:r>
-            <a:endParaRPr sz="1500" i="1"/>
+            <a:endParaRPr lang="en-US" altLang="en-GB"/>
           </a:p>
           <a:p>
             <a:pPr marL="457200" lvl="0" indent="-342900" algn="l" rtl="0">
@@ -8201,7 +9849,7 @@
             </a:pPr>
             <a:r>
               <a:rPr lang="en-US" altLang="en-GB"/>
-              <a:t>Javascript</a:t>
+              <a:t>Partial Classes</a:t>
             </a:r>
             <a:endParaRPr lang="en-US" altLang="en-GB"/>
           </a:p>
@@ -8218,7 +9866,246 @@
             </a:pPr>
             <a:r>
               <a:rPr lang="en-US" altLang="en-GB"/>
-              <a:t>Javascript and CSS Isolation</a:t>
+              <a:t>Layout</a:t>
+            </a:r>
+            <a:endParaRPr sz="1500" i="1"/>
+          </a:p>
+          <a:p>
+            <a:pPr marL="457200" lvl="0" indent="-342900" algn="l" rtl="0">
+              <a:spcBef>
+                <a:spcPts val="0"/>
+              </a:spcBef>
+              <a:spcAft>
+                <a:spcPts val="0"/>
+              </a:spcAft>
+              <a:buSzPts val="1800"/>
+              <a:buAutoNum type="arabicPeriod"/>
+            </a:pPr>
+            <a:r>
+              <a:rPr lang="en-US" altLang="en-GB"/>
+              <a:t>JavaScript and CSS Isolation</a:t>
+            </a:r>
+            <a:endParaRPr lang="en-GB"/>
+          </a:p>
+        </p:txBody>
+      </p:sp>
+    </p:spTree>
+  </p:cSld>
+  <p:clrMapOvr>
+    <a:masterClrMapping/>
+  </p:clrMapOvr>
+</p:sld>
+</file>
+
+<file path=ppt/slides/slide20.xml><?xml version="1.0" encoding="utf-8"?>
+<p:sld xmlns:a="http://schemas.openxmlformats.org/drawingml/2006/main" xmlns:r="http://schemas.openxmlformats.org/officeDocument/2006/relationships" xmlns:p="http://schemas.openxmlformats.org/presentationml/2006/main">
+  <p:cSld>
+    <p:spTree>
+      <p:nvGrpSpPr>
+        <p:cNvPr id="77" name="Shape 77"/>
+        <p:cNvGrpSpPr/>
+        <p:nvPr/>
+      </p:nvGrpSpPr>
+      <p:grpSpPr>
+        <a:xfrm>
+          <a:off x="0" y="0"/>
+          <a:ext cx="0" cy="0"/>
+          <a:chOff x="0" y="0"/>
+          <a:chExt cx="0" cy="0"/>
+        </a:xfrm>
+      </p:grpSpPr>
+      <p:sp>
+        <p:nvSpPr>
+          <p:cNvPr id="78" name="Google Shape;78;p15"/>
+          <p:cNvSpPr txBox="1"/>
+          <p:nvPr>
+            <p:ph type="title"/>
+          </p:nvPr>
+        </p:nvSpPr>
+        <p:spPr>
+          <a:xfrm>
+            <a:off x="311700" y="228490"/>
+            <a:ext cx="8520600" cy="707400"/>
+          </a:xfrm>
+          <a:prstGeom prst="rect">
+            <a:avLst/>
+          </a:prstGeom>
+        </p:spPr>
+        <p:txBody>
+          <a:bodyPr spcFirstLastPara="1" wrap="square" lIns="91425" tIns="91425" rIns="91425" bIns="91425" anchor="t" anchorCtr="0">
+            <a:normAutofit/>
+          </a:bodyPr>
+          <a:lstStyle/>
+          <a:p>
+            <a:pPr marL="0" lvl="0" indent="0" algn="l" rtl="0">
+              <a:spcBef>
+                <a:spcPts val="0"/>
+              </a:spcBef>
+              <a:spcAft>
+                <a:spcPts val="0"/>
+              </a:spcAft>
+              <a:buSzPts val="990"/>
+              <a:buNone/>
+            </a:pPr>
+            <a:r>
+              <a:rPr lang="en-US" altLang="en-GB" sz="2935">
+                <a:sym typeface="+mn-ea"/>
+              </a:rPr>
+              <a:t>7</a:t>
+            </a:r>
+            <a:r>
+              <a:rPr lang="en-GB" sz="2935">
+                <a:sym typeface="+mn-ea"/>
+              </a:rPr>
+              <a:t>. </a:t>
+            </a:r>
+            <a:r>
+              <a:rPr lang="en-US" altLang="en-GB" sz="2935">
+                <a:sym typeface="+mn-ea"/>
+              </a:rPr>
+              <a:t>CSS</a:t>
+            </a:r>
+            <a:r>
+              <a:rPr lang="en-US" altLang="en-GB" sz="2935">
+                <a:sym typeface="+mn-ea"/>
+              </a:rPr>
+              <a:t> isolation</a:t>
+            </a:r>
+            <a:endParaRPr lang="en-US" altLang="en-GB" sz="2940"/>
+          </a:p>
+        </p:txBody>
+      </p:sp>
+      <p:sp>
+        <p:nvSpPr>
+          <p:cNvPr id="79" name="Google Shape;79;p15"/>
+          <p:cNvSpPr txBox="1"/>
+          <p:nvPr>
+            <p:ph type="body" idx="1"/>
+          </p:nvPr>
+        </p:nvSpPr>
+        <p:spPr>
+          <a:xfrm>
+            <a:off x="311785" y="3980180"/>
+            <a:ext cx="8520430" cy="588645"/>
+          </a:xfrm>
+          <a:prstGeom prst="rect">
+            <a:avLst/>
+          </a:prstGeom>
+        </p:spPr>
+        <p:txBody>
+          <a:bodyPr spcFirstLastPara="1" wrap="square" lIns="91425" tIns="91425" rIns="91425" bIns="91425" anchor="t" anchorCtr="0">
+            <a:normAutofit/>
+          </a:bodyPr>
+          <a:lstStyle/>
+          <a:p>
+            <a:pPr marL="457200" lvl="0" indent="-342900" algn="l" rtl="0">
+              <a:spcBef>
+                <a:spcPts val="0"/>
+              </a:spcBef>
+              <a:spcAft>
+                <a:spcPts val="0"/>
+              </a:spcAft>
+              <a:buSzPts val="1800"/>
+              <a:buChar char="+"/>
+            </a:pPr>
+            <a:r>
+              <a:rPr lang="en-US" altLang="en-GB" b="1">
+                <a:sym typeface="+mn-ea"/>
+              </a:rPr>
+              <a:t>We want to load certain JS files on a component that were are in.</a:t>
+            </a:r>
+            <a:endParaRPr lang="en-US">
+              <a:solidFill>
+                <a:srgbClr val="B45F06"/>
+              </a:solidFill>
+            </a:endParaRPr>
+          </a:p>
+        </p:txBody>
+      </p:sp>
+      <p:pic>
+        <p:nvPicPr>
+          <p:cNvPr id="2" name="Picture 1"/>
+          <p:cNvPicPr>
+            <a:picLocks noChangeAspect="1"/>
+          </p:cNvPicPr>
+          <p:nvPr/>
+        </p:nvPicPr>
+        <p:blipFill>
+          <a:blip r:embed="rId1"/>
+          <a:stretch>
+            <a:fillRect/>
+          </a:stretch>
+        </p:blipFill>
+        <p:spPr>
+          <a:xfrm>
+            <a:off x="1776730" y="935990"/>
+            <a:ext cx="5591175" cy="2913380"/>
+          </a:xfrm>
+          <a:prstGeom prst="rect">
+            <a:avLst/>
+          </a:prstGeom>
+        </p:spPr>
+      </p:pic>
+    </p:spTree>
+  </p:cSld>
+  <p:clrMapOvr>
+    <a:masterClrMapping/>
+  </p:clrMapOvr>
+</p:sld>
+</file>
+
+<file path=ppt/slides/slide21.xml><?xml version="1.0" encoding="utf-8"?>
+<p:sld xmlns:a="http://schemas.openxmlformats.org/drawingml/2006/main" xmlns:r="http://schemas.openxmlformats.org/officeDocument/2006/relationships" xmlns:p="http://schemas.openxmlformats.org/presentationml/2006/main">
+  <p:cSld>
+    <p:spTree>
+      <p:nvGrpSpPr>
+        <p:cNvPr id="450" name="Shape 450"/>
+        <p:cNvGrpSpPr/>
+        <p:nvPr/>
+      </p:nvGrpSpPr>
+      <p:grpSpPr>
+        <a:xfrm>
+          <a:off x="0" y="0"/>
+          <a:ext cx="0" cy="0"/>
+          <a:chOff x="0" y="0"/>
+          <a:chExt cx="0" cy="0"/>
+        </a:xfrm>
+      </p:grpSpPr>
+      <p:sp>
+        <p:nvSpPr>
+          <p:cNvPr id="451" name="Google Shape;451;p61"/>
+          <p:cNvSpPr txBox="1"/>
+          <p:nvPr>
+            <p:ph type="title"/>
+          </p:nvPr>
+        </p:nvSpPr>
+        <p:spPr>
+          <a:xfrm>
+            <a:off x="311700" y="814800"/>
+            <a:ext cx="8571300" cy="942000"/>
+          </a:xfrm>
+          <a:prstGeom prst="rect">
+            <a:avLst/>
+          </a:prstGeom>
+        </p:spPr>
+        <p:txBody>
+          <a:bodyPr spcFirstLastPara="1" wrap="square" lIns="91425" tIns="91425" rIns="91425" bIns="91425" anchor="ctr" anchorCtr="0">
+            <a:normAutofit/>
+          </a:bodyPr>
+          <a:lstStyle/>
+          <a:p>
+            <a:pPr marL="0" lvl="0" indent="0" algn="ctr" rtl="0">
+              <a:spcBef>
+                <a:spcPts val="0"/>
+              </a:spcBef>
+              <a:spcAft>
+                <a:spcPts val="0"/>
+              </a:spcAft>
+              <a:buNone/>
+            </a:pPr>
+            <a:r>
+              <a:rPr lang="en-GB"/>
+              <a:t>THANKS FOR LISTENING</a:t>
             </a:r>
             <a:endParaRPr lang="en-GB"/>
           </a:p>

</xml_diff>